<commit_message>
Updated ppt and removed hardcoded mac
</commit_message>
<xml_diff>
--- a/Project_Update.pptx
+++ b/Project_Update.pptx
@@ -12,6 +12,8 @@
     <p:sldId id="261" r:id="rId6"/>
     <p:sldId id="262" r:id="rId7"/>
     <p:sldId id="260" r:id="rId8"/>
+    <p:sldId id="264" r:id="rId9"/>
+    <p:sldId id="263" r:id="rId10"/>
   </p:sldIdLst>
   <p:sldSz cx="12192000" cy="6858000"/>
   <p:notesSz cx="6858000" cy="9144000"/>
@@ -364,7 +366,7 @@
             <a:fld id="{B61BEF0D-F0BB-DE4B-95CE-6DB70DBA9567}" type="datetimeFigureOut">
               <a:rPr lang="en-US" dirty="0"/>
               <a:pPr/>
-              <a:t>4/17/2018</a:t>
+              <a:t>5/1/2018</a:t>
             </a:fld>
             <a:endParaRPr lang="en-US" dirty="0"/>
           </a:p>
@@ -623,7 +625,7 @@
             <a:fld id="{B61BEF0D-F0BB-DE4B-95CE-6DB70DBA9567}" type="datetimeFigureOut">
               <a:rPr lang="en-US" dirty="0"/>
               <a:pPr/>
-              <a:t>4/17/2018</a:t>
+              <a:t>5/1/2018</a:t>
             </a:fld>
             <a:endParaRPr lang="en-US" dirty="0"/>
           </a:p>
@@ -855,7 +857,7 @@
             <a:fld id="{B61BEF0D-F0BB-DE4B-95CE-6DB70DBA9567}" type="datetimeFigureOut">
               <a:rPr lang="en-US" dirty="0"/>
               <a:pPr/>
-              <a:t>4/17/2018</a:t>
+              <a:t>5/1/2018</a:t>
             </a:fld>
             <a:endParaRPr lang="en-US" dirty="0"/>
           </a:p>
@@ -1092,7 +1094,7 @@
             <a:fld id="{B61BEF0D-F0BB-DE4B-95CE-6DB70DBA9567}" type="datetimeFigureOut">
               <a:rPr lang="en-US" dirty="0"/>
               <a:pPr/>
-              <a:t>4/17/2018</a:t>
+              <a:t>5/1/2018</a:t>
             </a:fld>
             <a:endParaRPr lang="en-US" dirty="0"/>
           </a:p>
@@ -1396,7 +1398,7 @@
             <a:fld id="{B61BEF0D-F0BB-DE4B-95CE-6DB70DBA9567}" type="datetimeFigureOut">
               <a:rPr lang="en-US" dirty="0"/>
               <a:pPr/>
-              <a:t>4/17/2018</a:t>
+              <a:t>5/1/2018</a:t>
             </a:fld>
             <a:endParaRPr lang="en-US" dirty="0"/>
           </a:p>
@@ -1695,7 +1697,7 @@
             <a:fld id="{B61BEF0D-F0BB-DE4B-95CE-6DB70DBA9567}" type="datetimeFigureOut">
               <a:rPr lang="en-US" dirty="0"/>
               <a:pPr/>
-              <a:t>4/17/2018</a:t>
+              <a:t>5/1/2018</a:t>
             </a:fld>
             <a:endParaRPr lang="en-US" dirty="0"/>
           </a:p>
@@ -2114,7 +2116,7 @@
             <a:fld id="{B61BEF0D-F0BB-DE4B-95CE-6DB70DBA9567}" type="datetimeFigureOut">
               <a:rPr lang="en-US" dirty="0"/>
               <a:pPr/>
-              <a:t>4/17/2018</a:t>
+              <a:t>5/1/2018</a:t>
             </a:fld>
             <a:endParaRPr lang="en-US" dirty="0"/>
           </a:p>
@@ -2273,7 +2275,7 @@
             <a:fld id="{B61BEF0D-F0BB-DE4B-95CE-6DB70DBA9567}" type="datetimeFigureOut">
               <a:rPr lang="en-US" dirty="0"/>
               <a:pPr/>
-              <a:t>4/17/2018</a:t>
+              <a:t>5/1/2018</a:t>
             </a:fld>
             <a:endParaRPr lang="en-US" dirty="0"/>
           </a:p>
@@ -2365,7 +2367,7 @@
             <a:fld id="{B61BEF0D-F0BB-DE4B-95CE-6DB70DBA9567}" type="datetimeFigureOut">
               <a:rPr lang="en-US" dirty="0"/>
               <a:pPr/>
-              <a:t>4/17/2018</a:t>
+              <a:t>5/1/2018</a:t>
             </a:fld>
             <a:endParaRPr lang="en-US" dirty="0"/>
           </a:p>
@@ -2740,7 +2742,7 @@
             <a:fld id="{B61BEF0D-F0BB-DE4B-95CE-6DB70DBA9567}" type="datetimeFigureOut">
               <a:rPr lang="en-US" dirty="0"/>
               <a:pPr/>
-              <a:t>4/17/2018</a:t>
+              <a:t>5/1/2018</a:t>
             </a:fld>
             <a:endParaRPr lang="en-US" dirty="0"/>
           </a:p>
@@ -3026,7 +3028,7 @@
             <a:fld id="{B61BEF0D-F0BB-DE4B-95CE-6DB70DBA9567}" type="datetimeFigureOut">
               <a:rPr lang="en-US" dirty="0"/>
               <a:pPr/>
-              <a:t>4/17/2018</a:t>
+              <a:t>5/1/2018</a:t>
             </a:fld>
             <a:endParaRPr lang="en-US" dirty="0"/>
           </a:p>
@@ -3234,7 +3236,7 @@
             <a:fld id="{B61BEF0D-F0BB-DE4B-95CE-6DB70DBA9567}" type="datetimeFigureOut">
               <a:rPr lang="en-US" dirty="0"/>
               <a:pPr/>
-              <a:t>4/17/2018</a:t>
+              <a:t>5/1/2018</a:t>
             </a:fld>
             <a:endParaRPr lang="en-US" dirty="0"/>
           </a:p>
@@ -4147,7 +4149,7 @@
             </a:r>
             <a:r>
               <a:rPr lang="en-US" dirty="0"/>
-              <a:t>. – partially implemented</a:t>
+              <a:t>. – implemented</a:t>
             </a:r>
           </a:p>
           <a:p>
@@ -4181,7 +4183,7 @@
             </a:r>
             <a:r>
               <a:rPr lang="en-US" dirty="0"/>
-              <a:t>. – partially implemented</a:t>
+              <a:t>. – implemented</a:t>
             </a:r>
           </a:p>
           <a:p>
@@ -4215,7 +4217,7 @@
             </a:r>
             <a:r>
               <a:rPr lang="en-US" dirty="0"/>
-              <a:t>. – not yet implemented</a:t>
+              <a:t>. – implemented</a:t>
             </a:r>
           </a:p>
         </p:txBody>
@@ -4234,7 +4236,7 @@
 </file>
 
 <file path=ppt/slides/slide4.xml><?xml version="1.0" encoding="utf-8"?>
-<p:sld xmlns:a="http://schemas.openxmlformats.org/drawingml/2006/main" xmlns:r="http://schemas.openxmlformats.org/officeDocument/2006/relationships" xmlns:p="http://schemas.openxmlformats.org/presentationml/2006/main">
+<p:sld xmlns:a="http://schemas.openxmlformats.org/drawingml/2006/main" xmlns:r="http://schemas.openxmlformats.org/officeDocument/2006/relationships" xmlns:p="http://schemas.openxmlformats.org/presentationml/2006/main" show="0">
   <p:cSld>
     <p:spTree>
       <p:nvGrpSpPr>
@@ -4346,7 +4348,7 @@
 </file>
 
 <file path=ppt/slides/slide5.xml><?xml version="1.0" encoding="utf-8"?>
-<p:sld xmlns:a="http://schemas.openxmlformats.org/drawingml/2006/main" xmlns:r="http://schemas.openxmlformats.org/officeDocument/2006/relationships" xmlns:p="http://schemas.openxmlformats.org/presentationml/2006/main">
+<p:sld xmlns:a="http://schemas.openxmlformats.org/drawingml/2006/main" xmlns:r="http://schemas.openxmlformats.org/officeDocument/2006/relationships" xmlns:p="http://schemas.openxmlformats.org/presentationml/2006/main" show="0">
   <p:cSld>
     <p:spTree>
       <p:nvGrpSpPr>
@@ -4464,7 +4466,7 @@
 </file>
 
 <file path=ppt/slides/slide6.xml><?xml version="1.0" encoding="utf-8"?>
-<p:sld xmlns:a="http://schemas.openxmlformats.org/drawingml/2006/main" xmlns:r="http://schemas.openxmlformats.org/officeDocument/2006/relationships" xmlns:p="http://schemas.openxmlformats.org/presentationml/2006/main">
+<p:sld xmlns:a="http://schemas.openxmlformats.org/drawingml/2006/main" xmlns:r="http://schemas.openxmlformats.org/officeDocument/2006/relationships" xmlns:p="http://schemas.openxmlformats.org/presentationml/2006/main" show="0">
   <p:cSld>
     <p:spTree>
       <p:nvGrpSpPr>
@@ -4582,6 +4584,116 @@
 </file>
 
 <file path=ppt/slides/slide7.xml><?xml version="1.0" encoding="utf-8"?>
+<p:sld xmlns:a="http://schemas.openxmlformats.org/drawingml/2006/main" xmlns:r="http://schemas.openxmlformats.org/officeDocument/2006/relationships" xmlns:p="http://schemas.openxmlformats.org/presentationml/2006/main" show="0">
+  <p:cSld>
+    <p:spTree>
+      <p:nvGrpSpPr>
+        <p:cNvPr id="1" name=""/>
+        <p:cNvGrpSpPr/>
+        <p:nvPr/>
+      </p:nvGrpSpPr>
+      <p:grpSpPr>
+        <a:xfrm>
+          <a:off x="0" y="0"/>
+          <a:ext cx="0" cy="0"/>
+          <a:chOff x="0" y="0"/>
+          <a:chExt cx="0" cy="0"/>
+        </a:xfrm>
+      </p:grpSpPr>
+      <p:sp>
+        <p:nvSpPr>
+          <p:cNvPr id="2" name="Title 1">
+            <a:extLst>
+              <a:ext uri="{FF2B5EF4-FFF2-40B4-BE49-F238E27FC236}">
+                <a16:creationId xmlns:a16="http://schemas.microsoft.com/office/drawing/2014/main" id="{791B135C-F775-4CB2-AE0B-A564EFC94318}"/>
+              </a:ext>
+            </a:extLst>
+          </p:cNvPr>
+          <p:cNvSpPr>
+            <a:spLocks noGrp="1"/>
+          </p:cNvSpPr>
+          <p:nvPr>
+            <p:ph type="title"/>
+          </p:nvPr>
+        </p:nvSpPr>
+        <p:spPr/>
+        <p:txBody>
+          <a:bodyPr/>
+          <a:lstStyle/>
+          <a:p>
+            <a:r>
+              <a:rPr lang="en-US" dirty="0"/>
+              <a:t>Next Steps</a:t>
+            </a:r>
+          </a:p>
+        </p:txBody>
+      </p:sp>
+      <p:sp>
+        <p:nvSpPr>
+          <p:cNvPr id="3" name="Content Placeholder 2">
+            <a:extLst>
+              <a:ext uri="{FF2B5EF4-FFF2-40B4-BE49-F238E27FC236}">
+                <a16:creationId xmlns:a16="http://schemas.microsoft.com/office/drawing/2014/main" id="{FB74BA62-D023-423C-AC55-017E66485D59}"/>
+              </a:ext>
+            </a:extLst>
+          </p:cNvPr>
+          <p:cNvSpPr>
+            <a:spLocks noGrp="1"/>
+          </p:cNvSpPr>
+          <p:nvPr>
+            <p:ph idx="1"/>
+          </p:nvPr>
+        </p:nvSpPr>
+        <p:spPr/>
+        <p:txBody>
+          <a:bodyPr/>
+          <a:lstStyle/>
+          <a:p>
+            <a:r>
+              <a:rPr lang="en-US" dirty="0"/>
+              <a:t>Analyze data to determine when machine status changes instead of simulating it</a:t>
+            </a:r>
+          </a:p>
+          <a:p>
+            <a:r>
+              <a:rPr lang="en-US" dirty="0"/>
+              <a:t>Add additional notification capabilities to send follow-up notifications for unloaded machine</a:t>
+            </a:r>
+          </a:p>
+          <a:p>
+            <a:r>
+              <a:rPr lang="en-US" dirty="0"/>
+              <a:t>Allow user to configure IFTTT API keys instead of hard-coding</a:t>
+            </a:r>
+          </a:p>
+          <a:p>
+            <a:r>
+              <a:rPr lang="en-US" dirty="0"/>
+              <a:t>Securely store IFTTT API key for each notification user</a:t>
+            </a:r>
+          </a:p>
+          <a:p>
+            <a:r>
+              <a:rPr lang="en-US" dirty="0"/>
+              <a:t>Improve user interface??</a:t>
+            </a:r>
+          </a:p>
+        </p:txBody>
+      </p:sp>
+    </p:spTree>
+    <p:extLst>
+      <p:ext uri="{BB962C8B-B14F-4D97-AF65-F5344CB8AC3E}">
+        <p14:creationId xmlns:p14="http://schemas.microsoft.com/office/powerpoint/2010/main" val="1177953582"/>
+      </p:ext>
+    </p:extLst>
+  </p:cSld>
+  <p:clrMapOvr>
+    <a:masterClrMapping/>
+  </p:clrMapOvr>
+</p:sld>
+</file>
+
+<file path=ppt/slides/slide8.xml><?xml version="1.0" encoding="utf-8"?>
 <p:sld xmlns:a="http://schemas.openxmlformats.org/drawingml/2006/main" xmlns:r="http://schemas.openxmlformats.org/officeDocument/2006/relationships" xmlns:p="http://schemas.openxmlformats.org/presentationml/2006/main">
   <p:cSld>
     <p:spTree>
@@ -4600,10 +4712,93 @@
       </p:grpSpPr>
       <p:sp>
         <p:nvSpPr>
+          <p:cNvPr id="4" name="Title 3">
+            <a:extLst>
+              <a:ext uri="{FF2B5EF4-FFF2-40B4-BE49-F238E27FC236}">
+                <a16:creationId xmlns:a16="http://schemas.microsoft.com/office/drawing/2014/main" id="{DDA1B5E7-3A93-456D-9CED-95AB9C141095}"/>
+              </a:ext>
+            </a:extLst>
+          </p:cNvPr>
+          <p:cNvSpPr>
+            <a:spLocks noGrp="1"/>
+          </p:cNvSpPr>
+          <p:nvPr>
+            <p:ph type="title"/>
+          </p:nvPr>
+        </p:nvSpPr>
+        <p:spPr/>
+        <p:txBody>
+          <a:bodyPr/>
+          <a:lstStyle/>
+          <a:p>
+            <a:r>
+              <a:rPr lang="en-US" dirty="0"/>
+              <a:t>Demo!</a:t>
+            </a:r>
+          </a:p>
+        </p:txBody>
+      </p:sp>
+      <p:sp>
+        <p:nvSpPr>
+          <p:cNvPr id="6" name="Text Placeholder 5">
+            <a:extLst>
+              <a:ext uri="{FF2B5EF4-FFF2-40B4-BE49-F238E27FC236}">
+                <a16:creationId xmlns:a16="http://schemas.microsoft.com/office/drawing/2014/main" id="{38FC7A4F-CB2F-4A16-A18B-162939BC5B87}"/>
+              </a:ext>
+            </a:extLst>
+          </p:cNvPr>
+          <p:cNvSpPr>
+            <a:spLocks noGrp="1"/>
+          </p:cNvSpPr>
+          <p:nvPr>
+            <p:ph type="body" idx="1"/>
+          </p:nvPr>
+        </p:nvSpPr>
+        <p:spPr/>
+        <p:txBody>
+          <a:bodyPr/>
+          <a:lstStyle/>
+          <a:p>
+            <a:endParaRPr lang="en-US"/>
+          </a:p>
+        </p:txBody>
+      </p:sp>
+    </p:spTree>
+    <p:extLst>
+      <p:ext uri="{BB962C8B-B14F-4D97-AF65-F5344CB8AC3E}">
+        <p14:creationId xmlns:p14="http://schemas.microsoft.com/office/powerpoint/2010/main" val="1223441720"/>
+      </p:ext>
+    </p:extLst>
+  </p:cSld>
+  <p:clrMapOvr>
+    <a:masterClrMapping/>
+  </p:clrMapOvr>
+</p:sld>
+</file>
+
+<file path=ppt/slides/slide9.xml><?xml version="1.0" encoding="utf-8"?>
+<p:sld xmlns:a="http://schemas.openxmlformats.org/drawingml/2006/main" xmlns:r="http://schemas.openxmlformats.org/officeDocument/2006/relationships" xmlns:p="http://schemas.openxmlformats.org/presentationml/2006/main">
+  <p:cSld>
+    <p:spTree>
+      <p:nvGrpSpPr>
+        <p:cNvPr id="1" name=""/>
+        <p:cNvGrpSpPr/>
+        <p:nvPr/>
+      </p:nvGrpSpPr>
+      <p:grpSpPr>
+        <a:xfrm>
+          <a:off x="0" y="0"/>
+          <a:ext cx="0" cy="0"/>
+          <a:chOff x="0" y="0"/>
+          <a:chExt cx="0" cy="0"/>
+        </a:xfrm>
+      </p:grpSpPr>
+      <p:sp>
+        <p:nvSpPr>
           <p:cNvPr id="2" name="Title 1">
             <a:extLst>
               <a:ext uri="{FF2B5EF4-FFF2-40B4-BE49-F238E27FC236}">
-                <a16:creationId xmlns:a16="http://schemas.microsoft.com/office/drawing/2014/main" id="{791B135C-F775-4CB2-AE0B-A564EFC94318}"/>
+                <a16:creationId xmlns:a16="http://schemas.microsoft.com/office/drawing/2014/main" id="{6BBC755C-09F9-410C-AFF7-D05E80B7B0FF}"/>
               </a:ext>
             </a:extLst>
           </p:cNvPr>
@@ -4621,7 +4816,7 @@
           <a:p>
             <a:r>
               <a:rPr lang="en-US" dirty="0"/>
-              <a:t>Next Steps</a:t>
+              <a:t>Future Work</a:t>
             </a:r>
           </a:p>
         </p:txBody>
@@ -4631,7 +4826,7 @@
           <p:cNvPr id="3" name="Content Placeholder 2">
             <a:extLst>
               <a:ext uri="{FF2B5EF4-FFF2-40B4-BE49-F238E27FC236}">
-                <a16:creationId xmlns:a16="http://schemas.microsoft.com/office/drawing/2014/main" id="{FB74BA62-D023-423C-AC55-017E66485D59}"/>
+                <a16:creationId xmlns:a16="http://schemas.microsoft.com/office/drawing/2014/main" id="{4842101D-901D-45E6-B932-F25C42BD08A4}"/>
               </a:ext>
             </a:extLst>
           </p:cNvPr>
@@ -4649,31 +4844,27 @@
           <a:p>
             <a:r>
               <a:rPr lang="en-US" dirty="0"/>
-              <a:t>Analyze data to determine when machine status changes instead of simulating it</a:t>
-            </a:r>
-          </a:p>
-          <a:p>
-            <a:r>
-              <a:rPr lang="en-US" dirty="0"/>
-              <a:t>Add additional notification capabilities to send follow-up notifications for unloaded machine</a:t>
-            </a:r>
-          </a:p>
-          <a:p>
-            <a:r>
-              <a:rPr lang="en-US" dirty="0"/>
-              <a:t>Allow user to configure IFTTT API keys instead of hard-coding</a:t>
-            </a:r>
-          </a:p>
-          <a:p>
-            <a:r>
-              <a:rPr lang="en-US" dirty="0"/>
-              <a:t>Securely store IFTTT API key for each notification user</a:t>
-            </a:r>
-          </a:p>
-          <a:p>
-            <a:r>
-              <a:rPr lang="en-US" dirty="0"/>
-              <a:t>Improve user interface??</a:t>
+              <a:t>Implement API key storage more securely (in progress)</a:t>
+            </a:r>
+          </a:p>
+          <a:p>
+            <a:r>
+              <a:rPr lang="en-US" dirty="0"/>
+              <a:t>Additional user feedback on </a:t>
+            </a:r>
+            <a:r>
+              <a:rPr lang="en-US" dirty="0" err="1"/>
+              <a:t>MetaWear</a:t>
+            </a:r>
+            <a:r>
+              <a:rPr lang="en-US" dirty="0"/>
+              <a:t> status</a:t>
+            </a:r>
+          </a:p>
+          <a:p>
+            <a:r>
+              <a:rPr lang="en-US" dirty="0"/>
+              <a:t>Allow more customization (notification intervals, etc.)</a:t>
             </a:r>
           </a:p>
         </p:txBody>
@@ -4681,7 +4872,7 @@
     </p:spTree>
     <p:extLst>
       <p:ext uri="{BB962C8B-B14F-4D97-AF65-F5344CB8AC3E}">
-        <p14:creationId xmlns:p14="http://schemas.microsoft.com/office/powerpoint/2010/main" val="1177953582"/>
+        <p14:creationId xmlns:p14="http://schemas.microsoft.com/office/powerpoint/2010/main" val="2025928733"/>
       </p:ext>
     </p:extLst>
   </p:cSld>

</xml_diff>